<commit_message>
Update best practices and gotchas
</commit_message>
<xml_diff>
--- a/Building SPAs in SharePoint Using AngularJS.pptx
+++ b/Building SPAs in SharePoint Using AngularJS.pptx
@@ -4105,8 +4105,8 @@
     <dgm:cxn modelId="{BAD6D932-295D-4B11-AB4F-C6A51681FEBF}" type="presOf" srcId="{CF2E496F-FE56-4416-B846-DC12E4577A57}" destId="{17A1F249-6BEF-4F56-A4D8-8470A1E98F15}" srcOrd="0" destOrd="4" presId="urn:microsoft.com/office/officeart/2005/8/layout/hProcess9"/>
     <dgm:cxn modelId="{EA0EE867-287C-4759-B04B-1A44DD272934}" srcId="{EB74A234-8CAB-45D0-A223-6A45EB9687CD}" destId="{73AD9478-DFBD-45AE-8C86-9F4CB3BB1065}" srcOrd="2" destOrd="0" parTransId="{9746DDD7-C15A-4CDE-A7A9-ECC7812B47E4}" sibTransId="{B69AF354-070B-44D2-9041-ADEA0B558672}"/>
     <dgm:cxn modelId="{04F02849-7425-4E1F-898E-FA7DF4ED9666}" srcId="{95A2F766-9D02-45F9-8F0E-E4477259B64E}" destId="{7BAE7899-E3C2-4B98-B54B-7CF98FABE6C9}" srcOrd="1" destOrd="0" parTransId="{6A4813D0-9A5E-4C8A-8814-6B3627CFB165}" sibTransId="{F555F416-CF8C-46B6-A6CB-31C043865330}"/>
+    <dgm:cxn modelId="{4B256FB0-F8A6-4FC7-9768-1B5644FB9597}" srcId="{95A2F766-9D02-45F9-8F0E-E4477259B64E}" destId="{06ABEAEB-0AB1-4B03-9DB2-1747D846F76E}" srcOrd="2" destOrd="0" parTransId="{39D41540-6B5A-4F2C-B728-B10955AEA6F0}" sibTransId="{31BEE491-4EB9-4240-BAFF-E839945F6CC2}"/>
     <dgm:cxn modelId="{06CBBF6D-5C60-4E24-85FE-3D72B5DF292D}" type="presOf" srcId="{D025C9CA-C276-4620-8793-4C01C8D3C8C5}" destId="{17A1F249-6BEF-4F56-A4D8-8470A1E98F15}" srcOrd="0" destOrd="5" presId="urn:microsoft.com/office/officeart/2005/8/layout/hProcess9"/>
-    <dgm:cxn modelId="{4B256FB0-F8A6-4FC7-9768-1B5644FB9597}" srcId="{95A2F766-9D02-45F9-8F0E-E4477259B64E}" destId="{06ABEAEB-0AB1-4B03-9DB2-1747D846F76E}" srcOrd="2" destOrd="0" parTransId="{39D41540-6B5A-4F2C-B728-B10955AEA6F0}" sibTransId="{31BEE491-4EB9-4240-BAFF-E839945F6CC2}"/>
     <dgm:cxn modelId="{56E07505-5528-42D2-BF65-AC0B13049BD5}" srcId="{06ABEAEB-0AB1-4B03-9DB2-1747D846F76E}" destId="{DAD5068A-7091-420C-87F0-598961455E7C}" srcOrd="0" destOrd="0" parTransId="{E2E48095-73D9-45CE-B1F4-5CC208A04174}" sibTransId="{6BA6DC11-1A25-4A5E-A262-45E03AB8968F}"/>
     <dgm:cxn modelId="{597B6F7A-1AB8-7A40-A88C-F20BDA8446CA}" type="presOf" srcId="{3D2CA84F-7F83-488E-9CE9-2466A7E58E8C}" destId="{C5C479F1-027C-425C-A0B3-5734FC2D9DF4}" srcOrd="0" destOrd="3" presId="urn:microsoft.com/office/officeart/2005/8/layout/hProcess9"/>
     <dgm:cxn modelId="{0E8AE683-6858-4ECC-8F94-9CB028DF1605}" srcId="{7BAE7899-E3C2-4B98-B54B-7CF98FABE6C9}" destId="{9D1C7FDD-1C7E-4F92-A303-4A4F612A191B}" srcOrd="0" destOrd="0" parTransId="{CE3951D3-C82F-4197-BB44-E4023C884400}" sibTransId="{78BC0FB8-1233-449C-947F-C73B9E9738DF}"/>
@@ -20038,7 +20038,7 @@
         </p:spPr>
         <p:txBody>
           <a:bodyPr>
-            <a:normAutofit fontScale="92500" lnSpcReduction="20000"/>
+            <a:normAutofit lnSpcReduction="10000"/>
           </a:bodyPr>
           <a:lstStyle/>
           <a:p>
@@ -20081,13 +20081,11 @@
           <a:p>
             <a:r>
               <a:rPr lang="en-US" dirty="0" smtClean="0"/>
-              <a:t>Modular Bundler: webpack</a:t>
-            </a:r>
-          </a:p>
-          <a:p>
+              <a:t>Package </a:t>
+            </a:r>
             <a:r>
               <a:rPr lang="en-US" dirty="0" smtClean="0"/>
-              <a:t>Package Manager: npm, Bower</a:t>
+              <a:t>Manager: npm, Bower</a:t>
             </a:r>
           </a:p>
           <a:p>
@@ -20859,32 +20857,44 @@
           <a:p>
             <a:r>
               <a:rPr lang="en-US" dirty="0" smtClean="0"/>
-              <a:t>Directives, directives, directives &gt; get Ready for Angular 2</a:t>
+              <a:t>Use </a:t>
+            </a:r>
+            <a:r>
+              <a:rPr lang="en-US" dirty="0" smtClean="0"/>
+              <a:t>Directives Everywhere &gt; </a:t>
+            </a:r>
+            <a:r>
+              <a:rPr lang="en-US" dirty="0" smtClean="0"/>
+              <a:t>get Ready for Angular 2</a:t>
             </a:r>
           </a:p>
           <a:p>
             <a:pPr lvl="1"/>
             <a:r>
               <a:rPr lang="en-US" dirty="0" smtClean="0"/>
-              <a:t>Avoid ng-include</a:t>
-            </a:r>
+              <a:t>Avoid </a:t>
+            </a:r>
+            <a:r>
+              <a:rPr lang="en-US" dirty="0" smtClean="0"/>
+              <a:t>using ng-include</a:t>
+            </a:r>
+            <a:endParaRPr lang="en-US" dirty="0" smtClean="0"/>
           </a:p>
           <a:p>
             <a:pPr lvl="1"/>
             <a:r>
               <a:rPr lang="en-US" dirty="0" smtClean="0"/>
-              <a:t>Can include their own controllers which reference services</a:t>
-            </a:r>
-            <a:endParaRPr lang="en-US" dirty="0" smtClean="0"/>
-          </a:p>
-          <a:p>
+              <a:t>Directives Can </a:t>
+            </a:r>
             <a:r>
               <a:rPr lang="en-US" dirty="0" smtClean="0"/>
-              <a:t>Build </a:t>
-            </a:r>
+              <a:t>include their own controllers which reference services</a:t>
+            </a:r>
+          </a:p>
+          <a:p>
             <a:r>
               <a:rPr lang="en-US" dirty="0" smtClean="0"/>
-              <a:t>and deploy often!!!</a:t>
+              <a:t>Build and deploy often!!!</a:t>
             </a:r>
           </a:p>
           <a:p>
@@ -21348,7 +21358,7 @@
 </file>
 
 <file path=ppt/slides/slide20.xml><?xml version="1.0" encoding="utf-8"?>
-<p:sld xmlns:a="http://schemas.openxmlformats.org/drawingml/2006/main" xmlns:r="http://schemas.openxmlformats.org/officeDocument/2006/relationships" xmlns:p="http://schemas.openxmlformats.org/presentationml/2006/main" showMasterSp="0">
+<p:sld xmlns:a="http://schemas.openxmlformats.org/drawingml/2006/main" xmlns:r="http://schemas.openxmlformats.org/officeDocument/2006/relationships" xmlns:p="http://schemas.openxmlformats.org/presentationml/2006/main">
   <p:cSld>
     <p:bg>
       <p:bgPr>
@@ -21405,14 +21415,14 @@
             <p:ph sz="quarter" idx="13"/>
             <p:extLst>
               <p:ext uri="{D42A27DB-BD31-4B8C-83A1-F6EECF244321}">
-                <p14:modId xmlns:p14="http://schemas.microsoft.com/office/powerpoint/2010/main" val="2808078137"/>
+                <p14:modId xmlns:p14="http://schemas.microsoft.com/office/powerpoint/2010/main" val="406042320"/>
               </p:ext>
             </p:extLst>
           </p:nvPr>
         </p:nvGraphicFramePr>
         <p:xfrm>
           <a:off x="915026" y="1828800"/>
-          <a:ext cx="10363200" cy="4632960"/>
+          <a:ext cx="10363200" cy="4876800"/>
         </p:xfrm>
         <a:graphic>
           <a:graphicData uri="http://schemas.openxmlformats.org/drawingml/2006/table">
@@ -21421,10 +21431,10 @@
                 <a:tableStyleId>{793D81CF-94F2-401A-BA57-92F5A7B2D0C5}</a:tableStyleId>
               </a:tblPr>
               <a:tblGrid>
-                <a:gridCol w="4130261"/>
-                <a:gridCol w="6232939"/>
+                <a:gridCol w="2437774"/>
+                <a:gridCol w="7925426"/>
               </a:tblGrid>
-              <a:tr h="331981">
+              <a:tr h="310771">
                 <a:tc>
                   <a:txBody>
                     <a:bodyPr/>
@@ -21454,7 +21464,7 @@
                   <a:tcPr marL="90115" marR="90115"/>
                 </a:tc>
               </a:tr>
-              <a:tr h="459980">
+              <a:tr h="536787">
                 <a:tc>
                   <a:txBody>
                     <a:bodyPr/>
@@ -21509,7 +21519,7 @@
                   <a:tcPr marL="90115" marR="90115"/>
                 </a:tc>
               </a:tr>
-              <a:tr h="627620">
+              <a:tr h="762802">
                 <a:tc>
                   <a:txBody>
                     <a:bodyPr/>
@@ -21583,7 +21593,68 @@
                   <a:tcPr marL="90115" marR="90115"/>
                 </a:tc>
               </a:tr>
-              <a:tr h="581900">
+              <a:tr h="536787">
+                <a:tc>
+                  <a:txBody>
+                    <a:bodyPr/>
+                    <a:lstStyle/>
+                    <a:p>
+                      <a:pPr marL="0" marR="0" indent="0" algn="l" defTabSz="914400" rtl="0" eaLnBrk="1" fontAlgn="auto" latinLnBrk="0" hangingPunct="1">
+                        <a:lnSpc>
+                          <a:spcPct val="100000"/>
+                        </a:lnSpc>
+                        <a:spcBef>
+                          <a:spcPts val="0"/>
+                        </a:spcBef>
+                        <a:spcAft>
+                          <a:spcPts val="0"/>
+                        </a:spcAft>
+                        <a:buClrTx/>
+                        <a:buSzTx/>
+                        <a:buFontTx/>
+                        <a:buNone/>
+                        <a:tabLst/>
+                        <a:defRPr/>
+                      </a:pPr>
+                      <a:r>
+                        <a:rPr lang="en-US" sz="1600" dirty="0" smtClean="0"/>
+                        <a:t>SharePoint Form</a:t>
+                      </a:r>
+                      <a:endParaRPr lang="en-US" sz="1600" dirty="0" smtClean="0"/>
+                    </a:p>
+                  </a:txBody>
+                  <a:tcPr marL="90115" marR="90115"/>
+                </a:tc>
+                <a:tc>
+                  <a:txBody>
+                    <a:bodyPr/>
+                    <a:lstStyle/>
+                    <a:p>
+                      <a:pPr marL="285750" indent="-285750">
+                        <a:buFont typeface="Arial" panose="020B0604020202020204" pitchFamily="34" charset="0"/>
+                        <a:buChar char="•"/>
+                      </a:pPr>
+                      <a:r>
+                        <a:rPr lang="en-US" sz="1600" baseline="0" dirty="0" smtClean="0"/>
+                        <a:t>Clicking a button in SharePoint submits the page. </a:t>
+                      </a:r>
+                    </a:p>
+                    <a:p>
+                      <a:pPr marL="285750" indent="-285750">
+                        <a:buFont typeface="Arial" panose="020B0604020202020204" pitchFamily="34" charset="0"/>
+                        <a:buChar char="•"/>
+                      </a:pPr>
+                      <a:r>
+                        <a:rPr lang="en-US" sz="1600" baseline="0" dirty="0" smtClean="0"/>
+                        <a:t>Pass $event in each button method and use ‘e.preventDefault()’.</a:t>
+                      </a:r>
+                      <a:endParaRPr lang="en-US" sz="1600" baseline="0" dirty="0" smtClean="0"/>
+                    </a:p>
+                  </a:txBody>
+                  <a:tcPr marL="90115" marR="90115"/>
+                </a:tc>
+              </a:tr>
+              <a:tr h="762802">
                 <a:tc>
                   <a:txBody>
                     <a:bodyPr/>
@@ -21656,7 +21727,7 @@
                   <a:tcPr marL="90115" marR="90115"/>
                 </a:tc>
               </a:tr>
-              <a:tr h="307580">
+              <a:tr h="536787">
                 <a:tc>
                   <a:txBody>
                     <a:bodyPr/>
@@ -21728,7 +21799,7 @@
                   <a:tcPr marL="90115" marR="90115"/>
                 </a:tc>
               </a:tr>
-              <a:tr h="399020">
+              <a:tr h="762802">
                 <a:tc>
                   <a:txBody>
                     <a:bodyPr/>
@@ -21810,7 +21881,7 @@
                   <a:tcPr marL="90115" marR="90115"/>
                 </a:tc>
               </a:tr>
-              <a:tr h="124700">
+              <a:tr h="310771">
                 <a:tc>
                   <a:txBody>
                     <a:bodyPr/>
@@ -21857,60 +21928,6 @@
                       <a:r>
                         <a:rPr lang="en-US" sz="1600" baseline="0" dirty="0" smtClean="0"/>
                         <a:t> upgrading tools (npm &amp; bower).</a:t>
-                      </a:r>
-                      <a:endParaRPr lang="en-US" sz="1600" dirty="0"/>
-                    </a:p>
-                  </a:txBody>
-                  <a:tcPr marL="90115" marR="90115"/>
-                </a:tc>
-              </a:tr>
-              <a:tr h="200900">
-                <a:tc>
-                  <a:txBody>
-                    <a:bodyPr/>
-                    <a:lstStyle/>
-                    <a:p>
-                      <a:pPr marL="0" marR="0" indent="0" algn="l" defTabSz="914400" rtl="0" eaLnBrk="1" fontAlgn="auto" latinLnBrk="0" hangingPunct="1">
-                        <a:lnSpc>
-                          <a:spcPct val="100000"/>
-                        </a:lnSpc>
-                        <a:spcBef>
-                          <a:spcPts val="0"/>
-                        </a:spcBef>
-                        <a:spcAft>
-                          <a:spcPts val="0"/>
-                        </a:spcAft>
-                        <a:buClrTx/>
-                        <a:buSzTx/>
-                        <a:buFontTx/>
-                        <a:buNone/>
-                        <a:tabLst/>
-                        <a:defRPr/>
-                      </a:pPr>
-                      <a:r>
-                        <a:rPr lang="en-US" sz="1600" dirty="0" smtClean="0"/>
-                        <a:t>Frameworks</a:t>
-                      </a:r>
-                    </a:p>
-                  </a:txBody>
-                  <a:tcPr marL="90115" marR="90115"/>
-                </a:tc>
-                <a:tc>
-                  <a:txBody>
-                    <a:bodyPr/>
-                    <a:lstStyle/>
-                    <a:p>
-                      <a:pPr marL="285750" indent="-285750">
-                        <a:buFont typeface="Arial" panose="020B0604020202020204" pitchFamily="34" charset="0"/>
-                        <a:buChar char="•"/>
-                      </a:pPr>
-                      <a:r>
-                        <a:rPr lang="en-US" sz="1600" dirty="0" smtClean="0"/>
-                        <a:t>"Framework</a:t>
-                      </a:r>
-                      <a:r>
-                        <a:rPr lang="en-US" sz="1600" baseline="0" dirty="0" smtClean="0"/>
-                        <a:t> of the week"</a:t>
                       </a:r>
                       <a:endParaRPr lang="en-US" sz="1600" dirty="0"/>
                     </a:p>
@@ -25445,7 +25462,7 @@
           </a:ln>
           <a:extLst>
             <a:ext uri="{91240B29-F687-4f45-9708-019B960494DF}">
-              <a14:hiddenLine xmlns="" xmlns:a14="http://schemas.microsoft.com/office/drawing/2010/main" w="9525">
+              <a14:hiddenLine xmlns:a14="http://schemas.microsoft.com/office/drawing/2010/main" xmlns="" w="9525">
                 <a:solidFill>
                   <a:srgbClr val="000000"/>
                 </a:solidFill>
@@ -25499,7 +25516,7 @@
           </a:ln>
           <a:extLst>
             <a:ext uri="{91240B29-F687-4f45-9708-019B960494DF}">
-              <a14:hiddenLine xmlns="" xmlns:a14="http://schemas.microsoft.com/office/drawing/2010/main" w="9525">
+              <a14:hiddenLine xmlns:a14="http://schemas.microsoft.com/office/drawing/2010/main" xmlns="" w="9525">
                 <a:solidFill>
                   <a:srgbClr val="000000"/>
                 </a:solidFill>

</xml_diff>